<commit_message>
Fixes to week 8 errors
Fixing an error in calculations of the solved spreadsheet and the first example in the slides
</commit_message>
<xml_diff>
--- a/week 8 (Lab 4- Binomials and AIC)/week_8_slides.pptx
+++ b/week 8 (Lab 4- Binomials and AIC)/week_8_slides.pptx
@@ -5,18 +5,20 @@
     <p:sldMasterId id="2147483648" r:id="rId1"/>
   </p:sldMasterIdLst>
   <p:notesMasterIdLst>
-    <p:notesMasterId r:id="rId11"/>
+    <p:notesMasterId r:id="rId13"/>
   </p:notesMasterIdLst>
   <p:sldIdLst>
     <p:sldId id="265" r:id="rId2"/>
     <p:sldId id="257" r:id="rId3"/>
-    <p:sldId id="258" r:id="rId4"/>
-    <p:sldId id="259" r:id="rId5"/>
-    <p:sldId id="260" r:id="rId6"/>
-    <p:sldId id="262" r:id="rId7"/>
-    <p:sldId id="261" r:id="rId8"/>
-    <p:sldId id="263" r:id="rId9"/>
-    <p:sldId id="264" r:id="rId10"/>
+    <p:sldId id="266" r:id="rId4"/>
+    <p:sldId id="267" r:id="rId5"/>
+    <p:sldId id="258" r:id="rId6"/>
+    <p:sldId id="259" r:id="rId7"/>
+    <p:sldId id="260" r:id="rId8"/>
+    <p:sldId id="262" r:id="rId9"/>
+    <p:sldId id="261" r:id="rId10"/>
+    <p:sldId id="263" r:id="rId11"/>
+    <p:sldId id="264" r:id="rId12"/>
   </p:sldIdLst>
   <p:sldSz cx="12192000" cy="6858000"/>
   <p:notesSz cx="6858000" cy="9144000"/>
@@ -115,19 +117,150 @@
       </a:defRPr>
     </a:lvl9pPr>
   </p:defaultTextStyle>
+  <p:extLst>
+    <p:ext uri="{EFAFB233-063F-42B5-8137-9DF3F51BA10A}">
+      <p15:sldGuideLst xmlns:p15="http://schemas.microsoft.com/office/powerpoint/2012/main"/>
+    </p:ext>
+  </p:extLst>
 </p:presentation>
 </file>
 
 <file path=ppt/revisionInfo.xml><?xml version="1.0" encoding="utf-8"?>
 <p1510:revInfo xmlns:a="http://schemas.openxmlformats.org/drawingml/2006/main" xmlns:r="http://schemas.openxmlformats.org/officeDocument/2006/relationships" xmlns:p1510="http://schemas.microsoft.com/office/powerpoint/2015/10/main">
   <p1510:revLst>
-    <p1510:client id="{11443B18-A483-4213-A735-6DC9BE48F321}" v="444" dt="2023-10-15T16:01:53.682"/>
+    <p1510:client id="{CC0237A4-8AD2-45FE-8962-62CA89C75A81}" v="12" dt="2023-10-18T16:29:17.628"/>
   </p1510:revLst>
 </p1510:revInfo>
 </file>
 
 <file path=ppt/changesInfos/changesInfo1.xml><?xml version="1.0" encoding="utf-8"?>
 <pc:chgInfo xmlns:a="http://schemas.openxmlformats.org/drawingml/2006/main" xmlns:r="http://schemas.openxmlformats.org/officeDocument/2006/relationships" xmlns:ac="http://schemas.microsoft.com/office/drawing/2013/main/command" xmlns:pc="http://schemas.microsoft.com/office/powerpoint/2013/main/command">
+  <pc:docChgLst>
+    <pc:chgData name="Liam Akerlof Berigan" userId="1a8d56fc-de3a-4c9a-bb6e-0d52f35feb29" providerId="ADAL" clId="{CC0237A4-8AD2-45FE-8962-62CA89C75A81}"/>
+    <pc:docChg chg="custSel addSld modSld">
+      <pc:chgData name="Liam Akerlof Berigan" userId="1a8d56fc-de3a-4c9a-bb6e-0d52f35feb29" providerId="ADAL" clId="{CC0237A4-8AD2-45FE-8962-62CA89C75A81}" dt="2023-10-18T16:29:17.628" v="762" actId="6549"/>
+      <pc:docMkLst>
+        <pc:docMk/>
+      </pc:docMkLst>
+      <pc:sldChg chg="modSp mod">
+        <pc:chgData name="Liam Akerlof Berigan" userId="1a8d56fc-de3a-4c9a-bb6e-0d52f35feb29" providerId="ADAL" clId="{CC0237A4-8AD2-45FE-8962-62CA89C75A81}" dt="2023-10-18T16:29:17.628" v="762" actId="6549"/>
+        <pc:sldMkLst>
+          <pc:docMk/>
+          <pc:sldMk cId="1800463736" sldId="258"/>
+        </pc:sldMkLst>
+        <pc:spChg chg="mod">
+          <ac:chgData name="Liam Akerlof Berigan" userId="1a8d56fc-de3a-4c9a-bb6e-0d52f35feb29" providerId="ADAL" clId="{CC0237A4-8AD2-45FE-8962-62CA89C75A81}" dt="2023-10-18T16:20:33.504" v="751" actId="20577"/>
+          <ac:spMkLst>
+            <pc:docMk/>
+            <pc:sldMk cId="1800463736" sldId="258"/>
+            <ac:spMk id="16" creationId="{42359FBC-F903-FA13-2929-D4785ED69BEF}"/>
+          </ac:spMkLst>
+        </pc:spChg>
+        <pc:spChg chg="mod">
+          <ac:chgData name="Liam Akerlof Berigan" userId="1a8d56fc-de3a-4c9a-bb6e-0d52f35feb29" providerId="ADAL" clId="{CC0237A4-8AD2-45FE-8962-62CA89C75A81}" dt="2023-10-18T16:20:41.419" v="753" actId="207"/>
+          <ac:spMkLst>
+            <pc:docMk/>
+            <pc:sldMk cId="1800463736" sldId="258"/>
+            <ac:spMk id="112" creationId="{E54A8A2F-1114-D0B9-A933-98DA88AEA566}"/>
+          </ac:spMkLst>
+        </pc:spChg>
+        <pc:spChg chg="mod">
+          <ac:chgData name="Liam Akerlof Berigan" userId="1a8d56fc-de3a-4c9a-bb6e-0d52f35feb29" providerId="ADAL" clId="{CC0237A4-8AD2-45FE-8962-62CA89C75A81}" dt="2023-10-18T16:20:44.165" v="754" actId="207"/>
+          <ac:spMkLst>
+            <pc:docMk/>
+            <pc:sldMk cId="1800463736" sldId="258"/>
+            <ac:spMk id="113" creationId="{35049C6E-4B97-A5C7-8541-1C206414099A}"/>
+          </ac:spMkLst>
+        </pc:spChg>
+        <pc:spChg chg="mod">
+          <ac:chgData name="Liam Akerlof Berigan" userId="1a8d56fc-de3a-4c9a-bb6e-0d52f35feb29" providerId="ADAL" clId="{CC0237A4-8AD2-45FE-8962-62CA89C75A81}" dt="2023-10-18T16:20:51.484" v="756" actId="207"/>
+          <ac:spMkLst>
+            <pc:docMk/>
+            <pc:sldMk cId="1800463736" sldId="258"/>
+            <ac:spMk id="114" creationId="{0CF06D47-827D-868F-718A-DF46C9477154}"/>
+          </ac:spMkLst>
+        </pc:spChg>
+        <pc:spChg chg="mod">
+          <ac:chgData name="Liam Akerlof Berigan" userId="1a8d56fc-de3a-4c9a-bb6e-0d52f35feb29" providerId="ADAL" clId="{CC0237A4-8AD2-45FE-8962-62CA89C75A81}" dt="2023-10-18T16:20:47.397" v="755" actId="207"/>
+          <ac:spMkLst>
+            <pc:docMk/>
+            <pc:sldMk cId="1800463736" sldId="258"/>
+            <ac:spMk id="115" creationId="{D3CEC780-DE41-F259-DC55-5F06413EF35D}"/>
+          </ac:spMkLst>
+        </pc:spChg>
+        <pc:spChg chg="mod">
+          <ac:chgData name="Liam Akerlof Berigan" userId="1a8d56fc-de3a-4c9a-bb6e-0d52f35feb29" providerId="ADAL" clId="{CC0237A4-8AD2-45FE-8962-62CA89C75A81}" dt="2023-10-18T16:20:55.656" v="757" actId="207"/>
+          <ac:spMkLst>
+            <pc:docMk/>
+            <pc:sldMk cId="1800463736" sldId="258"/>
+            <ac:spMk id="116" creationId="{928540AD-AD8C-3639-77A9-50AA786AB1E0}"/>
+          </ac:spMkLst>
+        </pc:spChg>
+        <pc:spChg chg="mod">
+          <ac:chgData name="Liam Akerlof Berigan" userId="1a8d56fc-de3a-4c9a-bb6e-0d52f35feb29" providerId="ADAL" clId="{CC0237A4-8AD2-45FE-8962-62CA89C75A81}" dt="2023-10-18T16:20:59.492" v="758" actId="207"/>
+          <ac:spMkLst>
+            <pc:docMk/>
+            <pc:sldMk cId="1800463736" sldId="258"/>
+            <ac:spMk id="117" creationId="{9069C663-CDA4-2917-AF9D-897A06AD46AE}"/>
+          </ac:spMkLst>
+        </pc:spChg>
+        <pc:spChg chg="mod">
+          <ac:chgData name="Liam Akerlof Berigan" userId="1a8d56fc-de3a-4c9a-bb6e-0d52f35feb29" providerId="ADAL" clId="{CC0237A4-8AD2-45FE-8962-62CA89C75A81}" dt="2023-10-18T16:29:17.628" v="762" actId="6549"/>
+          <ac:spMkLst>
+            <pc:docMk/>
+            <pc:sldMk cId="1800463736" sldId="258"/>
+            <ac:spMk id="119" creationId="{FD89DEE4-1270-6CE1-2216-08282E8EDA3F}"/>
+          </ac:spMkLst>
+        </pc:spChg>
+      </pc:sldChg>
+      <pc:sldChg chg="modSp new mod">
+        <pc:chgData name="Liam Akerlof Berigan" userId="1a8d56fc-de3a-4c9a-bb6e-0d52f35feb29" providerId="ADAL" clId="{CC0237A4-8AD2-45FE-8962-62CA89C75A81}" dt="2023-10-16T14:37:23.749" v="191" actId="20577"/>
+        <pc:sldMkLst>
+          <pc:docMk/>
+          <pc:sldMk cId="309569958" sldId="266"/>
+        </pc:sldMkLst>
+        <pc:spChg chg="mod">
+          <ac:chgData name="Liam Akerlof Berigan" userId="1a8d56fc-de3a-4c9a-bb6e-0d52f35feb29" providerId="ADAL" clId="{CC0237A4-8AD2-45FE-8962-62CA89C75A81}" dt="2023-10-16T14:35:52.819" v="29" actId="20577"/>
+          <ac:spMkLst>
+            <pc:docMk/>
+            <pc:sldMk cId="309569958" sldId="266"/>
+            <ac:spMk id="2" creationId="{7E1464CB-E7E4-D8E3-AE6F-B952280935F2}"/>
+          </ac:spMkLst>
+        </pc:spChg>
+        <pc:spChg chg="mod">
+          <ac:chgData name="Liam Akerlof Berigan" userId="1a8d56fc-de3a-4c9a-bb6e-0d52f35feb29" providerId="ADAL" clId="{CC0237A4-8AD2-45FE-8962-62CA89C75A81}" dt="2023-10-16T14:37:23.749" v="191" actId="20577"/>
+          <ac:spMkLst>
+            <pc:docMk/>
+            <pc:sldMk cId="309569958" sldId="266"/>
+            <ac:spMk id="3" creationId="{8E510363-282D-EFA4-C3A1-8BB5D6EB1E5E}"/>
+          </ac:spMkLst>
+        </pc:spChg>
+      </pc:sldChg>
+      <pc:sldChg chg="modSp add mod">
+        <pc:chgData name="Liam Akerlof Berigan" userId="1a8d56fc-de3a-4c9a-bb6e-0d52f35feb29" providerId="ADAL" clId="{CC0237A4-8AD2-45FE-8962-62CA89C75A81}" dt="2023-10-16T14:52:33.040" v="747" actId="20577"/>
+        <pc:sldMkLst>
+          <pc:docMk/>
+          <pc:sldMk cId="1313829943" sldId="267"/>
+        </pc:sldMkLst>
+        <pc:spChg chg="mod">
+          <ac:chgData name="Liam Akerlof Berigan" userId="1a8d56fc-de3a-4c9a-bb6e-0d52f35feb29" providerId="ADAL" clId="{CC0237A4-8AD2-45FE-8962-62CA89C75A81}" dt="2023-10-16T14:37:45.744" v="242" actId="20577"/>
+          <ac:spMkLst>
+            <pc:docMk/>
+            <pc:sldMk cId="1313829943" sldId="267"/>
+            <ac:spMk id="2" creationId="{7E1464CB-E7E4-D8E3-AE6F-B952280935F2}"/>
+          </ac:spMkLst>
+        </pc:spChg>
+        <pc:spChg chg="mod">
+          <ac:chgData name="Liam Akerlof Berigan" userId="1a8d56fc-de3a-4c9a-bb6e-0d52f35feb29" providerId="ADAL" clId="{CC0237A4-8AD2-45FE-8962-62CA89C75A81}" dt="2023-10-16T14:52:33.040" v="747" actId="20577"/>
+          <ac:spMkLst>
+            <pc:docMk/>
+            <pc:sldMk cId="1313829943" sldId="267"/>
+            <ac:spMk id="3" creationId="{8E510363-282D-EFA4-C3A1-8BB5D6EB1E5E}"/>
+          </ac:spMkLst>
+        </pc:spChg>
+      </pc:sldChg>
+    </pc:docChg>
+  </pc:docChgLst>
   <pc:docChgLst>
     <pc:chgData name="Liam Akerlof Berigan" userId="1a8d56fc-de3a-4c9a-bb6e-0d52f35feb29" providerId="ADAL" clId="{11443B18-A483-4213-A735-6DC9BE48F321}"/>
     <pc:docChg chg="undo custSel addSld delSld modSld">
@@ -1012,7 +1145,7 @@
           <a:p>
             <a:fld id="{3192E06E-A888-47C2-B4D8-E35B2145CB77}" type="datetimeFigureOut">
               <a:rPr lang="en-US" smtClean="0"/>
-              <a:t>10/15/2023</a:t>
+              <a:t>10/18/2023</a:t>
             </a:fld>
             <a:endParaRPr lang="en-US"/>
           </a:p>
@@ -1463,7 +1596,7 @@
           <a:p>
             <a:fld id="{8683F534-D338-43A4-A9B3-D142FBD4DF53}" type="slidenum">
               <a:rPr lang="en-US" smtClean="0"/>
-              <a:t>3</a:t>
+              <a:t>5</a:t>
             </a:fld>
             <a:endParaRPr lang="en-US"/>
           </a:p>
@@ -1577,7 +1710,7 @@
           <a:p>
             <a:fld id="{8683F534-D338-43A4-A9B3-D142FBD4DF53}" type="slidenum">
               <a:rPr lang="en-US" smtClean="0"/>
-              <a:t>5</a:t>
+              <a:t>7</a:t>
             </a:fld>
             <a:endParaRPr lang="en-US"/>
           </a:p>
@@ -1743,7 +1876,7 @@
           <a:p>
             <a:fld id="{6C66E326-E100-4DC9-8FDC-3991C30974EB}" type="datetimeFigureOut">
               <a:rPr lang="en-US" smtClean="0"/>
-              <a:t>10/15/2023</a:t>
+              <a:t>10/18/2023</a:t>
             </a:fld>
             <a:endParaRPr lang="en-US"/>
           </a:p>
@@ -1941,7 +2074,7 @@
           <a:p>
             <a:fld id="{6C66E326-E100-4DC9-8FDC-3991C30974EB}" type="datetimeFigureOut">
               <a:rPr lang="en-US" smtClean="0"/>
-              <a:t>10/15/2023</a:t>
+              <a:t>10/18/2023</a:t>
             </a:fld>
             <a:endParaRPr lang="en-US"/>
           </a:p>
@@ -2149,7 +2282,7 @@
           <a:p>
             <a:fld id="{6C66E326-E100-4DC9-8FDC-3991C30974EB}" type="datetimeFigureOut">
               <a:rPr lang="en-US" smtClean="0"/>
-              <a:t>10/15/2023</a:t>
+              <a:t>10/18/2023</a:t>
             </a:fld>
             <a:endParaRPr lang="en-US"/>
           </a:p>
@@ -2347,7 +2480,7 @@
           <a:p>
             <a:fld id="{6C66E326-E100-4DC9-8FDC-3991C30974EB}" type="datetimeFigureOut">
               <a:rPr lang="en-US" smtClean="0"/>
-              <a:t>10/15/2023</a:t>
+              <a:t>10/18/2023</a:t>
             </a:fld>
             <a:endParaRPr lang="en-US"/>
           </a:p>
@@ -2622,7 +2755,7 @@
           <a:p>
             <a:fld id="{6C66E326-E100-4DC9-8FDC-3991C30974EB}" type="datetimeFigureOut">
               <a:rPr lang="en-US" smtClean="0"/>
-              <a:t>10/15/2023</a:t>
+              <a:t>10/18/2023</a:t>
             </a:fld>
             <a:endParaRPr lang="en-US"/>
           </a:p>
@@ -2887,7 +3020,7 @@
           <a:p>
             <a:fld id="{6C66E326-E100-4DC9-8FDC-3991C30974EB}" type="datetimeFigureOut">
               <a:rPr lang="en-US" smtClean="0"/>
-              <a:t>10/15/2023</a:t>
+              <a:t>10/18/2023</a:t>
             </a:fld>
             <a:endParaRPr lang="en-US"/>
           </a:p>
@@ -3299,7 +3432,7 @@
           <a:p>
             <a:fld id="{6C66E326-E100-4DC9-8FDC-3991C30974EB}" type="datetimeFigureOut">
               <a:rPr lang="en-US" smtClean="0"/>
-              <a:t>10/15/2023</a:t>
+              <a:t>10/18/2023</a:t>
             </a:fld>
             <a:endParaRPr lang="en-US"/>
           </a:p>
@@ -3440,7 +3573,7 @@
           <a:p>
             <a:fld id="{6C66E326-E100-4DC9-8FDC-3991C30974EB}" type="datetimeFigureOut">
               <a:rPr lang="en-US" smtClean="0"/>
-              <a:t>10/15/2023</a:t>
+              <a:t>10/18/2023</a:t>
             </a:fld>
             <a:endParaRPr lang="en-US"/>
           </a:p>
@@ -3553,7 +3686,7 @@
           <a:p>
             <a:fld id="{6C66E326-E100-4DC9-8FDC-3991C30974EB}" type="datetimeFigureOut">
               <a:rPr lang="en-US" smtClean="0"/>
-              <a:t>10/15/2023</a:t>
+              <a:t>10/18/2023</a:t>
             </a:fld>
             <a:endParaRPr lang="en-US"/>
           </a:p>
@@ -3864,7 +3997,7 @@
           <a:p>
             <a:fld id="{6C66E326-E100-4DC9-8FDC-3991C30974EB}" type="datetimeFigureOut">
               <a:rPr lang="en-US" smtClean="0"/>
-              <a:t>10/15/2023</a:t>
+              <a:t>10/18/2023</a:t>
             </a:fld>
             <a:endParaRPr lang="en-US"/>
           </a:p>
@@ -4152,7 +4285,7 @@
           <a:p>
             <a:fld id="{6C66E326-E100-4DC9-8FDC-3991C30974EB}" type="datetimeFigureOut">
               <a:rPr lang="en-US" smtClean="0"/>
-              <a:t>10/15/2023</a:t>
+              <a:t>10/18/2023</a:t>
             </a:fld>
             <a:endParaRPr lang="en-US"/>
           </a:p>
@@ -4393,7 +4526,7 @@
           <a:p>
             <a:fld id="{6C66E326-E100-4DC9-8FDC-3991C30974EB}" type="datetimeFigureOut">
               <a:rPr lang="en-US" smtClean="0"/>
-              <a:t>10/15/2023</a:t>
+              <a:t>10/18/2023</a:t>
             </a:fld>
             <a:endParaRPr lang="en-US"/>
           </a:p>
@@ -4954,6 +5087,616 @@
 </p:sld>
 </file>
 
+<file path=ppt/slides/slide10.xml><?xml version="1.0" encoding="utf-8"?>
+<p:sld xmlns:a="http://schemas.openxmlformats.org/drawingml/2006/main" xmlns:r="http://schemas.openxmlformats.org/officeDocument/2006/relationships" xmlns:p="http://schemas.openxmlformats.org/presentationml/2006/main">
+  <p:cSld>
+    <p:spTree>
+      <p:nvGrpSpPr>
+        <p:cNvPr id="1" name=""/>
+        <p:cNvGrpSpPr/>
+        <p:nvPr/>
+      </p:nvGrpSpPr>
+      <p:grpSpPr>
+        <a:xfrm>
+          <a:off x="0" y="0"/>
+          <a:ext cx="0" cy="0"/>
+          <a:chOff x="0" y="0"/>
+          <a:chExt cx="0" cy="0"/>
+        </a:xfrm>
+      </p:grpSpPr>
+      <p:sp>
+        <p:nvSpPr>
+          <p:cNvPr id="2" name="Title 1">
+            <a:extLst>
+              <a:ext uri="{FF2B5EF4-FFF2-40B4-BE49-F238E27FC236}">
+                <a16:creationId xmlns:a16="http://schemas.microsoft.com/office/drawing/2014/main" id="{4B21A50A-7B89-5106-7078-723CED01C9EB}"/>
+              </a:ext>
+            </a:extLst>
+          </p:cNvPr>
+          <p:cNvSpPr>
+            <a:spLocks noGrp="1"/>
+          </p:cNvSpPr>
+          <p:nvPr>
+            <p:ph type="title"/>
+          </p:nvPr>
+        </p:nvSpPr>
+        <p:spPr/>
+        <p:txBody>
+          <a:bodyPr/>
+          <a:lstStyle/>
+          <a:p>
+            <a:r>
+              <a:rPr lang="en-US" dirty="0"/>
+              <a:t>AIC uses likelihood for model selection</a:t>
+            </a:r>
+          </a:p>
+        </p:txBody>
+      </p:sp>
+      <mc:AlternateContent xmlns:mc="http://schemas.openxmlformats.org/markup-compatibility/2006" xmlns:a14="http://schemas.microsoft.com/office/drawing/2010/main">
+        <mc:Choice Requires="a14">
+          <p:sp>
+            <p:nvSpPr>
+              <p:cNvPr id="4" name="TextBox 3">
+                <a:extLst>
+                  <a:ext uri="{FF2B5EF4-FFF2-40B4-BE49-F238E27FC236}">
+                    <a16:creationId xmlns:a16="http://schemas.microsoft.com/office/drawing/2014/main" id="{6C42931D-12C0-2C69-3395-59462A322A2B}"/>
+                  </a:ext>
+                </a:extLst>
+              </p:cNvPr>
+              <p:cNvSpPr txBox="1"/>
+              <p:nvPr/>
+            </p:nvSpPr>
+            <p:spPr>
+              <a:xfrm>
+                <a:off x="3369583" y="3217331"/>
+                <a:ext cx="5101140" cy="521105"/>
+              </a:xfrm>
+              <a:prstGeom prst="rect">
+                <a:avLst/>
+              </a:prstGeom>
+              <a:noFill/>
+            </p:spPr>
+            <p:txBody>
+              <a:bodyPr wrap="none" lIns="0" tIns="0" rIns="0" bIns="0" rtlCol="0">
+                <a:spAutoFit/>
+              </a:bodyPr>
+              <a:lstStyle/>
+              <a:p>
+                <a:pPr/>
+                <a14:m>
+                  <m:oMathPara xmlns:m="http://schemas.openxmlformats.org/officeDocument/2006/math">
+                    <m:oMathParaPr>
+                      <m:jc m:val="centerGroup"/>
+                    </m:oMathParaPr>
+                    <m:oMath xmlns:m="http://schemas.openxmlformats.org/officeDocument/2006/math">
+                      <m:r>
+                        <a:rPr lang="en-US" sz="3000" b="0" i="1" smtClean="0">
+                          <a:latin typeface="Cambria Math" panose="02040503050406030204" pitchFamily="18" charset="0"/>
+                        </a:rPr>
+                        <m:t>𝐴𝐼𝐶</m:t>
+                      </m:r>
+                      <m:r>
+                        <a:rPr lang="en-US" sz="3000" i="1" smtClean="0">
+                          <a:latin typeface="Cambria Math" panose="02040503050406030204" pitchFamily="18" charset="0"/>
+                        </a:rPr>
+                        <m:t>=</m:t>
+                      </m:r>
+                      <m:r>
+                        <a:rPr lang="en-US" sz="3000" b="0" i="1" smtClean="0">
+                          <a:latin typeface="Cambria Math" panose="02040503050406030204" pitchFamily="18" charset="0"/>
+                        </a:rPr>
+                        <m:t>−2</m:t>
+                      </m:r>
+                      <m:func>
+                        <m:funcPr>
+                          <m:ctrlPr>
+                            <a:rPr lang="en-US" sz="3000" b="0" i="1" smtClean="0">
+                              <a:latin typeface="Cambria Math" panose="02040503050406030204" pitchFamily="18" charset="0"/>
+                            </a:rPr>
+                          </m:ctrlPr>
+                        </m:funcPr>
+                        <m:fName>
+                          <m:r>
+                            <m:rPr>
+                              <m:sty m:val="p"/>
+                            </m:rPr>
+                            <a:rPr lang="en-US" sz="3000" b="0" i="0" smtClean="0">
+                              <a:latin typeface="Cambria Math" panose="02040503050406030204" pitchFamily="18" charset="0"/>
+                            </a:rPr>
+                            <m:t>ln</m:t>
+                          </m:r>
+                        </m:fName>
+                        <m:e>
+                          <m:d>
+                            <m:dPr>
+                              <m:ctrlPr>
+                                <a:rPr lang="en-US" sz="3000" b="0" i="1" smtClean="0">
+                                  <a:latin typeface="Cambria Math" panose="02040503050406030204" pitchFamily="18" charset="0"/>
+                                </a:rPr>
+                              </m:ctrlPr>
+                            </m:dPr>
+                            <m:e>
+                              <m:r>
+                                <a:rPr lang="en-US" sz="3000" b="0" i="1" smtClean="0">
+                                  <a:latin typeface="Cambria Math" panose="02040503050406030204" pitchFamily="18" charset="0"/>
+                                </a:rPr>
+                                <m:t>𝐿</m:t>
+                              </m:r>
+                              <m:r>
+                                <a:rPr lang="en-US" sz="3000" b="0" i="1" smtClean="0">
+                                  <a:latin typeface="Cambria Math" panose="02040503050406030204" pitchFamily="18" charset="0"/>
+                                </a:rPr>
+                                <m:t>(</m:t>
+                              </m:r>
+                              <m:acc>
+                                <m:accPr>
+                                  <m:chr m:val="̂"/>
+                                  <m:ctrlPr>
+                                    <a:rPr lang="en-US" sz="3000" b="0" i="1" smtClean="0">
+                                      <a:latin typeface="Cambria Math" panose="02040503050406030204" pitchFamily="18" charset="0"/>
+                                    </a:rPr>
+                                  </m:ctrlPr>
+                                </m:accPr>
+                                <m:e>
+                                  <m:r>
+                                    <a:rPr lang="en-US" sz="3000" b="0" i="1" smtClean="0">
+                                      <a:latin typeface="Cambria Math" panose="02040503050406030204" pitchFamily="18" charset="0"/>
+                                      <a:ea typeface="Cambria Math" panose="02040503050406030204" pitchFamily="18" charset="0"/>
+                                    </a:rPr>
+                                    <m:t>𝜃</m:t>
+                                  </m:r>
+                                </m:e>
+                              </m:acc>
+                              <m:r>
+                                <a:rPr lang="en-US" sz="3000" b="0" i="1" smtClean="0">
+                                  <a:latin typeface="Cambria Math" panose="02040503050406030204" pitchFamily="18" charset="0"/>
+                                </a:rPr>
+                                <m:t>|</m:t>
+                              </m:r>
+                              <m:r>
+                                <a:rPr lang="en-US" sz="3000" b="0" i="1" smtClean="0">
+                                  <a:latin typeface="Cambria Math" panose="02040503050406030204" pitchFamily="18" charset="0"/>
+                                </a:rPr>
+                                <m:t>𝑑𝑎𝑡𝑎</m:t>
+                              </m:r>
+                              <m:r>
+                                <a:rPr lang="en-US" sz="3000" b="0" i="1" smtClean="0">
+                                  <a:latin typeface="Cambria Math" panose="02040503050406030204" pitchFamily="18" charset="0"/>
+                                </a:rPr>
+                                <m:t>)</m:t>
+                              </m:r>
+                            </m:e>
+                          </m:d>
+                        </m:e>
+                      </m:func>
+                      <m:r>
+                        <a:rPr lang="en-US" sz="3000" b="0" i="1" smtClean="0">
+                          <a:latin typeface="Cambria Math" panose="02040503050406030204" pitchFamily="18" charset="0"/>
+                        </a:rPr>
+                        <m:t>+2</m:t>
+                      </m:r>
+                      <m:r>
+                        <a:rPr lang="en-US" sz="3000" b="0" i="1" smtClean="0">
+                          <a:latin typeface="Cambria Math" panose="02040503050406030204" pitchFamily="18" charset="0"/>
+                        </a:rPr>
+                        <m:t>𝐾</m:t>
+                      </m:r>
+                    </m:oMath>
+                  </m:oMathPara>
+                </a14:m>
+                <a:endParaRPr lang="en-US" sz="3000" dirty="0"/>
+              </a:p>
+            </p:txBody>
+          </p:sp>
+        </mc:Choice>
+        <mc:Fallback xmlns="">
+          <p:sp>
+            <p:nvSpPr>
+              <p:cNvPr id="4" name="TextBox 3">
+                <a:extLst>
+                  <a:ext uri="{FF2B5EF4-FFF2-40B4-BE49-F238E27FC236}">
+                    <a16:creationId xmlns:a16="http://schemas.microsoft.com/office/drawing/2014/main" id="{6C42931D-12C0-2C69-3395-59462A322A2B}"/>
+                  </a:ext>
+                </a:extLst>
+              </p:cNvPr>
+              <p:cNvSpPr txBox="1">
+                <a:spLocks noRot="1" noChangeAspect="1" noMove="1" noResize="1" noEditPoints="1" noAdjustHandles="1" noChangeArrowheads="1" noChangeShapeType="1" noTextEdit="1"/>
+              </p:cNvSpPr>
+              <p:nvPr/>
+            </p:nvSpPr>
+            <p:spPr>
+              <a:xfrm>
+                <a:off x="3369583" y="3217331"/>
+                <a:ext cx="5101140" cy="521105"/>
+              </a:xfrm>
+              <a:prstGeom prst="rect">
+                <a:avLst/>
+              </a:prstGeom>
+              <a:blipFill>
+                <a:blip r:embed="rId2"/>
+                <a:stretch>
+                  <a:fillRect/>
+                </a:stretch>
+              </a:blipFill>
+            </p:spPr>
+            <p:txBody>
+              <a:bodyPr/>
+              <a:lstStyle/>
+              <a:p>
+                <a:r>
+                  <a:rPr lang="en-US">
+                    <a:noFill/>
+                  </a:rPr>
+                  <a:t> </a:t>
+                </a:r>
+              </a:p>
+            </p:txBody>
+          </p:sp>
+        </mc:Fallback>
+      </mc:AlternateContent>
+      <p:sp>
+        <p:nvSpPr>
+          <p:cNvPr id="5" name="TextBox 4">
+            <a:extLst>
+              <a:ext uri="{FF2B5EF4-FFF2-40B4-BE49-F238E27FC236}">
+                <a16:creationId xmlns:a16="http://schemas.microsoft.com/office/drawing/2014/main" id="{FDB04EBF-D24A-D162-0C37-53F9AC59DB2B}"/>
+              </a:ext>
+            </a:extLst>
+          </p:cNvPr>
+          <p:cNvSpPr txBox="1"/>
+          <p:nvPr/>
+        </p:nvSpPr>
+        <p:spPr>
+          <a:xfrm>
+            <a:off x="6775937" y="2571000"/>
+            <a:ext cx="2883877" cy="646331"/>
+          </a:xfrm>
+          <a:prstGeom prst="rect">
+            <a:avLst/>
+          </a:prstGeom>
+          <a:noFill/>
+        </p:spPr>
+        <p:txBody>
+          <a:bodyPr wrap="square" rtlCol="0">
+            <a:spAutoFit/>
+          </a:bodyPr>
+          <a:lstStyle/>
+          <a:p>
+            <a:pPr algn="ctr"/>
+            <a:r>
+              <a:rPr lang="en-US" dirty="0"/>
+              <a:t>Penalty for # of parameters (parsimony)</a:t>
+            </a:r>
+          </a:p>
+        </p:txBody>
+      </p:sp>
+      <p:sp>
+        <p:nvSpPr>
+          <p:cNvPr id="6" name="TextBox 5">
+            <a:extLst>
+              <a:ext uri="{FF2B5EF4-FFF2-40B4-BE49-F238E27FC236}">
+                <a16:creationId xmlns:a16="http://schemas.microsoft.com/office/drawing/2014/main" id="{793EB5DA-A33F-FD81-53EB-22A1FB435693}"/>
+              </a:ext>
+            </a:extLst>
+          </p:cNvPr>
+          <p:cNvSpPr txBox="1"/>
+          <p:nvPr/>
+        </p:nvSpPr>
+        <p:spPr>
+          <a:xfrm>
+            <a:off x="4478214" y="3798277"/>
+            <a:ext cx="2883877" cy="369332"/>
+          </a:xfrm>
+          <a:prstGeom prst="rect">
+            <a:avLst/>
+          </a:prstGeom>
+          <a:noFill/>
+        </p:spPr>
+        <p:txBody>
+          <a:bodyPr wrap="square" rtlCol="0">
+            <a:spAutoFit/>
+          </a:bodyPr>
+          <a:lstStyle/>
+          <a:p>
+            <a:pPr algn="ctr"/>
+            <a:r>
+              <a:rPr lang="en-US" dirty="0"/>
+              <a:t>Likelihood of the model</a:t>
+            </a:r>
+          </a:p>
+        </p:txBody>
+      </p:sp>
+      <p:sp>
+        <p:nvSpPr>
+          <p:cNvPr id="7" name="TextBox 6">
+            <a:extLst>
+              <a:ext uri="{FF2B5EF4-FFF2-40B4-BE49-F238E27FC236}">
+                <a16:creationId xmlns:a16="http://schemas.microsoft.com/office/drawing/2014/main" id="{7EA996F0-6002-1669-2BC8-C026EDBD2122}"/>
+              </a:ext>
+            </a:extLst>
+          </p:cNvPr>
+          <p:cNvSpPr txBox="1"/>
+          <p:nvPr/>
+        </p:nvSpPr>
+        <p:spPr>
+          <a:xfrm>
+            <a:off x="3119778" y="4945208"/>
+            <a:ext cx="5600747" cy="861774"/>
+          </a:xfrm>
+          <a:prstGeom prst="rect">
+            <a:avLst/>
+          </a:prstGeom>
+          <a:noFill/>
+        </p:spPr>
+        <p:txBody>
+          <a:bodyPr wrap="square" rtlCol="0">
+            <a:spAutoFit/>
+          </a:bodyPr>
+          <a:lstStyle/>
+          <a:p>
+            <a:pPr algn="ctr"/>
+            <a:r>
+              <a:rPr lang="en-US" sz="2500" i="1" dirty="0"/>
+              <a:t>The best model is the one with the smallest AIC</a:t>
+            </a:r>
+          </a:p>
+        </p:txBody>
+      </p:sp>
+    </p:spTree>
+    <p:extLst>
+      <p:ext uri="{BB962C8B-B14F-4D97-AF65-F5344CB8AC3E}">
+        <p14:creationId xmlns:p14="http://schemas.microsoft.com/office/powerpoint/2010/main" val="2042862758"/>
+      </p:ext>
+    </p:extLst>
+  </p:cSld>
+  <p:clrMapOvr>
+    <a:masterClrMapping/>
+  </p:clrMapOvr>
+  <p:timing>
+    <p:tnLst>
+      <p:par>
+        <p:cTn id="1" dur="indefinite" restart="never" nodeType="tmRoot">
+          <p:childTnLst>
+            <p:seq concurrent="1" nextAc="seek">
+              <p:cTn id="2" dur="indefinite" nodeType="mainSeq">
+                <p:childTnLst>
+                  <p:par>
+                    <p:cTn id="3" fill="hold">
+                      <p:stCondLst>
+                        <p:cond delay="indefinite"/>
+                      </p:stCondLst>
+                      <p:childTnLst>
+                        <p:par>
+                          <p:cTn id="4" fill="hold">
+                            <p:stCondLst>
+                              <p:cond delay="0"/>
+                            </p:stCondLst>
+                            <p:childTnLst>
+                              <p:par>
+                                <p:cTn id="5" presetID="10" presetClass="entr" presetSubtype="0" fill="hold" grpId="0" nodeType="clickEffect">
+                                  <p:stCondLst>
+                                    <p:cond delay="0"/>
+                                  </p:stCondLst>
+                                  <p:childTnLst>
+                                    <p:set>
+                                      <p:cBhvr>
+                                        <p:cTn id="6" dur="1" fill="hold">
+                                          <p:stCondLst>
+                                            <p:cond delay="0"/>
+                                          </p:stCondLst>
+                                        </p:cTn>
+                                        <p:tgtEl>
+                                          <p:spTgt spid="6"/>
+                                        </p:tgtEl>
+                                        <p:attrNameLst>
+                                          <p:attrName>style.visibility</p:attrName>
+                                        </p:attrNameLst>
+                                      </p:cBhvr>
+                                      <p:to>
+                                        <p:strVal val="visible"/>
+                                      </p:to>
+                                    </p:set>
+                                    <p:animEffect transition="in" filter="fade">
+                                      <p:cBhvr>
+                                        <p:cTn id="7" dur="500"/>
+                                        <p:tgtEl>
+                                          <p:spTgt spid="6"/>
+                                        </p:tgtEl>
+                                      </p:cBhvr>
+                                    </p:animEffect>
+                                  </p:childTnLst>
+                                </p:cTn>
+                              </p:par>
+                              <p:par>
+                                <p:cTn id="8" presetID="10" presetClass="entr" presetSubtype="0" fill="hold" grpId="0" nodeType="withEffect">
+                                  <p:stCondLst>
+                                    <p:cond delay="0"/>
+                                  </p:stCondLst>
+                                  <p:childTnLst>
+                                    <p:set>
+                                      <p:cBhvr>
+                                        <p:cTn id="9" dur="1" fill="hold">
+                                          <p:stCondLst>
+                                            <p:cond delay="0"/>
+                                          </p:stCondLst>
+                                        </p:cTn>
+                                        <p:tgtEl>
+                                          <p:spTgt spid="5"/>
+                                        </p:tgtEl>
+                                        <p:attrNameLst>
+                                          <p:attrName>style.visibility</p:attrName>
+                                        </p:attrNameLst>
+                                      </p:cBhvr>
+                                      <p:to>
+                                        <p:strVal val="visible"/>
+                                      </p:to>
+                                    </p:set>
+                                    <p:animEffect transition="in" filter="fade">
+                                      <p:cBhvr>
+                                        <p:cTn id="10" dur="500"/>
+                                        <p:tgtEl>
+                                          <p:spTgt spid="5"/>
+                                        </p:tgtEl>
+                                      </p:cBhvr>
+                                    </p:animEffect>
+                                  </p:childTnLst>
+                                </p:cTn>
+                              </p:par>
+                            </p:childTnLst>
+                          </p:cTn>
+                        </p:par>
+                      </p:childTnLst>
+                    </p:cTn>
+                  </p:par>
+                  <p:par>
+                    <p:cTn id="11" fill="hold">
+                      <p:stCondLst>
+                        <p:cond delay="indefinite"/>
+                      </p:stCondLst>
+                      <p:childTnLst>
+                        <p:par>
+                          <p:cTn id="12" fill="hold">
+                            <p:stCondLst>
+                              <p:cond delay="0"/>
+                            </p:stCondLst>
+                            <p:childTnLst>
+                              <p:par>
+                                <p:cTn id="13" presetID="10" presetClass="entr" presetSubtype="0" fill="hold" grpId="0" nodeType="clickEffect">
+                                  <p:stCondLst>
+                                    <p:cond delay="0"/>
+                                  </p:stCondLst>
+                                  <p:childTnLst>
+                                    <p:set>
+                                      <p:cBhvr>
+                                        <p:cTn id="14" dur="1" fill="hold">
+                                          <p:stCondLst>
+                                            <p:cond delay="0"/>
+                                          </p:stCondLst>
+                                        </p:cTn>
+                                        <p:tgtEl>
+                                          <p:spTgt spid="7"/>
+                                        </p:tgtEl>
+                                        <p:attrNameLst>
+                                          <p:attrName>style.visibility</p:attrName>
+                                        </p:attrNameLst>
+                                      </p:cBhvr>
+                                      <p:to>
+                                        <p:strVal val="visible"/>
+                                      </p:to>
+                                    </p:set>
+                                    <p:animEffect transition="in" filter="fade">
+                                      <p:cBhvr>
+                                        <p:cTn id="15" dur="500"/>
+                                        <p:tgtEl>
+                                          <p:spTgt spid="7"/>
+                                        </p:tgtEl>
+                                      </p:cBhvr>
+                                    </p:animEffect>
+                                  </p:childTnLst>
+                                </p:cTn>
+                              </p:par>
+                            </p:childTnLst>
+                          </p:cTn>
+                        </p:par>
+                      </p:childTnLst>
+                    </p:cTn>
+                  </p:par>
+                </p:childTnLst>
+              </p:cTn>
+              <p:prevCondLst>
+                <p:cond evt="onPrev" delay="0">
+                  <p:tgtEl>
+                    <p:sldTgt/>
+                  </p:tgtEl>
+                </p:cond>
+              </p:prevCondLst>
+              <p:nextCondLst>
+                <p:cond evt="onNext" delay="0">
+                  <p:tgtEl>
+                    <p:sldTgt/>
+                  </p:tgtEl>
+                </p:cond>
+              </p:nextCondLst>
+            </p:seq>
+          </p:childTnLst>
+        </p:cTn>
+      </p:par>
+    </p:tnLst>
+    <p:bldLst>
+      <p:bldP spid="5" grpId="0"/>
+      <p:bldP spid="6" grpId="0"/>
+      <p:bldP spid="7" grpId="0"/>
+    </p:bldLst>
+  </p:timing>
+</p:sld>
+</file>
+
+<file path=ppt/slides/slide11.xml><?xml version="1.0" encoding="utf-8"?>
+<p:sld xmlns:a="http://schemas.openxmlformats.org/drawingml/2006/main" xmlns:r="http://schemas.openxmlformats.org/officeDocument/2006/relationships" xmlns:p="http://schemas.openxmlformats.org/presentationml/2006/main">
+  <p:cSld>
+    <p:spTree>
+      <p:nvGrpSpPr>
+        <p:cNvPr id="1" name=""/>
+        <p:cNvGrpSpPr/>
+        <p:nvPr/>
+      </p:nvGrpSpPr>
+      <p:grpSpPr>
+        <a:xfrm>
+          <a:off x="0" y="0"/>
+          <a:ext cx="0" cy="0"/>
+          <a:chOff x="0" y="0"/>
+          <a:chExt cx="0" cy="0"/>
+        </a:xfrm>
+      </p:grpSpPr>
+      <p:pic>
+        <p:nvPicPr>
+          <p:cNvPr id="3" name="Picture 2" descr="A close-up of a document&#10;&#10;Description automatically generated">
+            <a:extLst>
+              <a:ext uri="{FF2B5EF4-FFF2-40B4-BE49-F238E27FC236}">
+                <a16:creationId xmlns:a16="http://schemas.microsoft.com/office/drawing/2014/main" id="{68B24415-0E6A-2CB7-AD41-D4CFE7DC024E}"/>
+              </a:ext>
+            </a:extLst>
+          </p:cNvPr>
+          <p:cNvPicPr>
+            <a:picLocks noChangeAspect="1"/>
+          </p:cNvPicPr>
+          <p:nvPr/>
+        </p:nvPicPr>
+        <p:blipFill>
+          <a:blip r:embed="rId2">
+            <a:extLst>
+              <a:ext uri="{28A0092B-C50C-407E-A947-70E740481C1C}">
+                <a14:useLocalDpi xmlns:a14="http://schemas.microsoft.com/office/drawing/2010/main" val="0"/>
+              </a:ext>
+            </a:extLst>
+          </a:blip>
+          <a:stretch>
+            <a:fillRect/>
+          </a:stretch>
+        </p:blipFill>
+        <p:spPr>
+          <a:xfrm>
+            <a:off x="0" y="759141"/>
+            <a:ext cx="12192000" cy="4988025"/>
+          </a:xfrm>
+          <a:prstGeom prst="rect">
+            <a:avLst/>
+          </a:prstGeom>
+        </p:spPr>
+      </p:pic>
+    </p:spTree>
+    <p:extLst>
+      <p:ext uri="{BB962C8B-B14F-4D97-AF65-F5344CB8AC3E}">
+        <p14:creationId xmlns:p14="http://schemas.microsoft.com/office/powerpoint/2010/main" val="2862968705"/>
+      </p:ext>
+    </p:extLst>
+  </p:cSld>
+  <p:clrMapOvr>
+    <a:masterClrMapping/>
+  </p:clrMapOvr>
+</p:sld>
+</file>
+
 <file path=ppt/slides/slide2.xml><?xml version="1.0" encoding="utf-8"?>
 <p:sld xmlns:a="http://schemas.openxmlformats.org/drawingml/2006/main" xmlns:r="http://schemas.openxmlformats.org/officeDocument/2006/relationships" xmlns:p="http://schemas.openxmlformats.org/presentationml/2006/main">
   <p:cSld>
@@ -5158,6 +5901,242 @@
 </file>
 
 <file path=ppt/slides/slide3.xml><?xml version="1.0" encoding="utf-8"?>
+<p:sld xmlns:a="http://schemas.openxmlformats.org/drawingml/2006/main" xmlns:r="http://schemas.openxmlformats.org/officeDocument/2006/relationships" xmlns:p="http://schemas.openxmlformats.org/presentationml/2006/main">
+  <p:cSld>
+    <p:spTree>
+      <p:nvGrpSpPr>
+        <p:cNvPr id="1" name=""/>
+        <p:cNvGrpSpPr/>
+        <p:nvPr/>
+      </p:nvGrpSpPr>
+      <p:grpSpPr>
+        <a:xfrm>
+          <a:off x="0" y="0"/>
+          <a:ext cx="0" cy="0"/>
+          <a:chOff x="0" y="0"/>
+          <a:chExt cx="0" cy="0"/>
+        </a:xfrm>
+      </p:grpSpPr>
+      <p:sp>
+        <p:nvSpPr>
+          <p:cNvPr id="2" name="Title 1">
+            <a:extLst>
+              <a:ext uri="{FF2B5EF4-FFF2-40B4-BE49-F238E27FC236}">
+                <a16:creationId xmlns:a16="http://schemas.microsoft.com/office/drawing/2014/main" id="{7E1464CB-E7E4-D8E3-AE6F-B952280935F2}"/>
+              </a:ext>
+            </a:extLst>
+          </p:cNvPr>
+          <p:cNvSpPr>
+            <a:spLocks noGrp="1"/>
+          </p:cNvSpPr>
+          <p:nvPr>
+            <p:ph type="title"/>
+          </p:nvPr>
+        </p:nvSpPr>
+        <p:spPr/>
+        <p:txBody>
+          <a:bodyPr/>
+          <a:lstStyle/>
+          <a:p>
+            <a:r>
+              <a:rPr lang="en-US" dirty="0"/>
+              <a:t>Guidelines for submission</a:t>
+            </a:r>
+          </a:p>
+        </p:txBody>
+      </p:sp>
+      <p:sp>
+        <p:nvSpPr>
+          <p:cNvPr id="3" name="Content Placeholder 2">
+            <a:extLst>
+              <a:ext uri="{FF2B5EF4-FFF2-40B4-BE49-F238E27FC236}">
+                <a16:creationId xmlns:a16="http://schemas.microsoft.com/office/drawing/2014/main" id="{8E510363-282D-EFA4-C3A1-8BB5D6EB1E5E}"/>
+              </a:ext>
+            </a:extLst>
+          </p:cNvPr>
+          <p:cNvSpPr>
+            <a:spLocks noGrp="1"/>
+          </p:cNvSpPr>
+          <p:nvPr>
+            <p:ph idx="1"/>
+          </p:nvPr>
+        </p:nvSpPr>
+        <p:spPr/>
+        <p:txBody>
+          <a:bodyPr/>
+          <a:lstStyle/>
+          <a:p>
+            <a:r>
+              <a:rPr lang="en-US" dirty="0"/>
+              <a:t>Submit assignments using one of the following formats:</a:t>
+            </a:r>
+          </a:p>
+          <a:p>
+            <a:pPr lvl="1"/>
+            <a:r>
+              <a:rPr lang="en-US" dirty="0"/>
+              <a:t>Word document: .doc/.docx</a:t>
+            </a:r>
+          </a:p>
+          <a:p>
+            <a:pPr lvl="1"/>
+            <a:r>
+              <a:rPr lang="en-US" dirty="0"/>
+              <a:t>Excel document: .</a:t>
+            </a:r>
+            <a:r>
+              <a:rPr lang="en-US" dirty="0" err="1"/>
+              <a:t>xls</a:t>
+            </a:r>
+            <a:r>
+              <a:rPr lang="en-US" dirty="0"/>
+              <a:t>/.xlsx</a:t>
+            </a:r>
+          </a:p>
+          <a:p>
+            <a:pPr lvl="1"/>
+            <a:r>
+              <a:rPr lang="en-US" dirty="0"/>
+              <a:t>R script: .R (NOT .</a:t>
+            </a:r>
+            <a:r>
+              <a:rPr lang="en-US" dirty="0" err="1"/>
+              <a:t>RProj</a:t>
+            </a:r>
+            <a:r>
+              <a:rPr lang="en-US" dirty="0"/>
+              <a:t>)</a:t>
+            </a:r>
+          </a:p>
+        </p:txBody>
+      </p:sp>
+    </p:spTree>
+    <p:extLst>
+      <p:ext uri="{BB962C8B-B14F-4D97-AF65-F5344CB8AC3E}">
+        <p14:creationId xmlns:p14="http://schemas.microsoft.com/office/powerpoint/2010/main" val="309569958"/>
+      </p:ext>
+    </p:extLst>
+  </p:cSld>
+  <p:clrMapOvr>
+    <a:masterClrMapping/>
+  </p:clrMapOvr>
+</p:sld>
+</file>
+
+<file path=ppt/slides/slide4.xml><?xml version="1.0" encoding="utf-8"?>
+<p:sld xmlns:a="http://schemas.openxmlformats.org/drawingml/2006/main" xmlns:r="http://schemas.openxmlformats.org/officeDocument/2006/relationships" xmlns:p="http://schemas.openxmlformats.org/presentationml/2006/main">
+  <p:cSld>
+    <p:spTree>
+      <p:nvGrpSpPr>
+        <p:cNvPr id="1" name=""/>
+        <p:cNvGrpSpPr/>
+        <p:nvPr/>
+      </p:nvGrpSpPr>
+      <p:grpSpPr>
+        <a:xfrm>
+          <a:off x="0" y="0"/>
+          <a:ext cx="0" cy="0"/>
+          <a:chOff x="0" y="0"/>
+          <a:chExt cx="0" cy="0"/>
+        </a:xfrm>
+      </p:grpSpPr>
+      <p:sp>
+        <p:nvSpPr>
+          <p:cNvPr id="2" name="Title 1">
+            <a:extLst>
+              <a:ext uri="{FF2B5EF4-FFF2-40B4-BE49-F238E27FC236}">
+                <a16:creationId xmlns:a16="http://schemas.microsoft.com/office/drawing/2014/main" id="{7E1464CB-E7E4-D8E3-AE6F-B952280935F2}"/>
+              </a:ext>
+            </a:extLst>
+          </p:cNvPr>
+          <p:cNvSpPr>
+            <a:spLocks noGrp="1"/>
+          </p:cNvSpPr>
+          <p:nvPr>
+            <p:ph type="title"/>
+          </p:nvPr>
+        </p:nvSpPr>
+        <p:spPr/>
+        <p:txBody>
+          <a:bodyPr/>
+          <a:lstStyle/>
+          <a:p>
+            <a:r>
+              <a:rPr lang="en-US" dirty="0"/>
+              <a:t>Late penalties for partial assignments</a:t>
+            </a:r>
+          </a:p>
+        </p:txBody>
+      </p:sp>
+      <p:sp>
+        <p:nvSpPr>
+          <p:cNvPr id="3" name="Content Placeholder 2">
+            <a:extLst>
+              <a:ext uri="{FF2B5EF4-FFF2-40B4-BE49-F238E27FC236}">
+                <a16:creationId xmlns:a16="http://schemas.microsoft.com/office/drawing/2014/main" id="{8E510363-282D-EFA4-C3A1-8BB5D6EB1E5E}"/>
+              </a:ext>
+            </a:extLst>
+          </p:cNvPr>
+          <p:cNvSpPr>
+            <a:spLocks noGrp="1"/>
+          </p:cNvSpPr>
+          <p:nvPr>
+            <p:ph idx="1"/>
+          </p:nvPr>
+        </p:nvSpPr>
+        <p:spPr/>
+        <p:txBody>
+          <a:bodyPr/>
+          <a:lstStyle/>
+          <a:p>
+            <a:r>
+              <a:rPr lang="en-US" dirty="0"/>
+              <a:t>Lots of partial submissions in the past two weeks</a:t>
+            </a:r>
+          </a:p>
+          <a:p>
+            <a:pPr lvl="1"/>
+            <a:r>
+              <a:rPr lang="en-US" dirty="0"/>
+              <a:t>No unified policy</a:t>
+            </a:r>
+          </a:p>
+          <a:p>
+            <a:r>
+              <a:rPr lang="en-US" dirty="0"/>
+              <a:t>To ensure consistency in grading, we will follow this going forward:</a:t>
+            </a:r>
+          </a:p>
+          <a:p>
+            <a:pPr lvl="1"/>
+            <a:r>
+              <a:rPr lang="en-US" dirty="0"/>
+              <a:t>Late penalty for the assignment is based on the day when the last portion of the assignment is turned in</a:t>
+            </a:r>
+          </a:p>
+          <a:p>
+            <a:pPr lvl="1"/>
+            <a:r>
+              <a:rPr lang="en-US" dirty="0"/>
+              <a:t>Includes documents submitted in the wrong format</a:t>
+            </a:r>
+          </a:p>
+        </p:txBody>
+      </p:sp>
+    </p:spTree>
+    <p:extLst>
+      <p:ext uri="{BB962C8B-B14F-4D97-AF65-F5344CB8AC3E}">
+        <p14:creationId xmlns:p14="http://schemas.microsoft.com/office/powerpoint/2010/main" val="1313829943"/>
+      </p:ext>
+    </p:extLst>
+  </p:cSld>
+  <p:clrMapOvr>
+    <a:masterClrMapping/>
+  </p:clrMapOvr>
+</p:sld>
+</file>
+
+<file path=ppt/slides/slide5.xml><?xml version="1.0" encoding="utf-8"?>
 <p:sld xmlns:a="http://schemas.openxmlformats.org/drawingml/2006/main" xmlns:r="http://schemas.openxmlformats.org/officeDocument/2006/relationships" xmlns:p="http://schemas.openxmlformats.org/presentationml/2006/main">
   <p:cSld>
     <p:spTree>
@@ -5459,7 +6438,7 @@
           <a:p>
             <a:r>
               <a:rPr lang="en-US" i="1" dirty="0"/>
-              <a:t>How likely is it that we’ll get 1 heads and 2 tails? </a:t>
+              <a:t>How likely is it that we’ll get 2 heads and 1 tails? </a:t>
             </a:r>
           </a:p>
         </p:txBody>
@@ -6849,7 +7828,11 @@
           <a:p>
             <a:pPr algn="ctr"/>
             <a:r>
-              <a:rPr lang="en-US" b="1" dirty="0"/>
+              <a:rPr lang="en-US" b="1" dirty="0">
+                <a:solidFill>
+                  <a:srgbClr val="FF0000"/>
+                </a:solidFill>
+              </a:rPr>
               <a:t>2H 1T</a:t>
             </a:r>
           </a:p>
@@ -6885,7 +7868,11 @@
           <a:p>
             <a:pPr algn="ctr"/>
             <a:r>
-              <a:rPr lang="en-US" b="1" dirty="0"/>
+              <a:rPr lang="en-US" b="1" dirty="0">
+                <a:solidFill>
+                  <a:srgbClr val="FF0000"/>
+                </a:solidFill>
+              </a:rPr>
               <a:t>2H 1T</a:t>
             </a:r>
           </a:p>
@@ -6921,11 +7908,7 @@
           <a:p>
             <a:pPr algn="ctr"/>
             <a:r>
-              <a:rPr lang="en-US" b="1" dirty="0">
-                <a:solidFill>
-                  <a:srgbClr val="FF0000"/>
-                </a:solidFill>
-              </a:rPr>
+              <a:rPr lang="en-US" b="1" dirty="0"/>
               <a:t>1H 2T</a:t>
             </a:r>
           </a:p>
@@ -6961,7 +7944,11 @@
           <a:p>
             <a:pPr algn="ctr"/>
             <a:r>
-              <a:rPr lang="en-US" b="1" dirty="0"/>
+              <a:rPr lang="en-US" b="1" dirty="0">
+                <a:solidFill>
+                  <a:srgbClr val="FF0000"/>
+                </a:solidFill>
+              </a:rPr>
               <a:t>2H 1T</a:t>
             </a:r>
           </a:p>
@@ -6997,11 +7984,7 @@
           <a:p>
             <a:pPr algn="ctr"/>
             <a:r>
-              <a:rPr lang="en-US" b="1" dirty="0">
-                <a:solidFill>
-                  <a:srgbClr val="FF0000"/>
-                </a:solidFill>
-              </a:rPr>
+              <a:rPr lang="en-US" b="1" dirty="0"/>
               <a:t>1H 2T</a:t>
             </a:r>
           </a:p>
@@ -7037,11 +8020,7 @@
           <a:p>
             <a:pPr algn="ctr"/>
             <a:r>
-              <a:rPr lang="en-US" b="1" dirty="0">
-                <a:solidFill>
-                  <a:srgbClr val="FF0000"/>
-                </a:solidFill>
-              </a:rPr>
+              <a:rPr lang="en-US" b="1" dirty="0"/>
               <a:t>1H 2T</a:t>
             </a:r>
           </a:p>
@@ -7113,8 +8092,13 @@
             <a:pPr algn="ctr"/>
             <a:r>
               <a:rPr lang="en-US" i="1" dirty="0"/>
-              <a:t>3 out of 8 possible outcomes are 1H 2T</a:t>
-            </a:r>
+              <a:t>3 out of 8 possible outcomes </a:t>
+            </a:r>
+            <a:r>
+              <a:rPr lang="en-US" i="1"/>
+              <a:t>are 2H 1T</a:t>
+            </a:r>
+            <a:endParaRPr lang="en-US" i="1" dirty="0"/>
           </a:p>
         </p:txBody>
       </p:sp>
@@ -8769,7 +9753,7 @@
 </p:sld>
 </file>
 
-<file path=ppt/slides/slide4.xml><?xml version="1.0" encoding="utf-8"?>
+<file path=ppt/slides/slide6.xml><?xml version="1.0" encoding="utf-8"?>
 <p:sld xmlns:a="http://schemas.openxmlformats.org/drawingml/2006/main" xmlns:r="http://schemas.openxmlformats.org/officeDocument/2006/relationships" xmlns:p="http://schemas.openxmlformats.org/presentationml/2006/main">
   <p:cSld>
     <p:spTree>
@@ -8814,8 +9798,8 @@
           </a:p>
         </p:txBody>
       </p:sp>
-      <mc:AlternateContent xmlns:mc="http://schemas.openxmlformats.org/markup-compatibility/2006">
-        <mc:Choice xmlns:a14="http://schemas.microsoft.com/office/drawing/2010/main" Requires="a14">
+      <mc:AlternateContent xmlns:mc="http://schemas.openxmlformats.org/markup-compatibility/2006" xmlns:a14="http://schemas.microsoft.com/office/drawing/2010/main">
+        <mc:Choice Requires="a14">
           <p:sp>
             <p:nvSpPr>
               <p:cNvPr id="4" name="TextBox 3">
@@ -8844,6 +9828,7 @@
               </a:bodyPr>
               <a:lstStyle/>
               <a:p>
+                <a:pPr/>
                 <a14:m>
                   <m:oMathPara xmlns:m="http://schemas.openxmlformats.org/officeDocument/2006/math">
                     <m:oMathParaPr>
@@ -8973,7 +9958,7 @@
             </p:txBody>
           </p:sp>
         </mc:Choice>
-        <mc:Fallback>
+        <mc:Fallback xmlns="">
           <p:sp>
             <p:nvSpPr>
               <p:cNvPr id="4" name="TextBox 3">
@@ -9018,8 +10003,8 @@
           </p:sp>
         </mc:Fallback>
       </mc:AlternateContent>
-      <mc:AlternateContent xmlns:mc="http://schemas.openxmlformats.org/markup-compatibility/2006">
-        <mc:Choice xmlns:a14="http://schemas.microsoft.com/office/drawing/2010/main" Requires="a14">
+      <mc:AlternateContent xmlns:mc="http://schemas.openxmlformats.org/markup-compatibility/2006" xmlns:a14="http://schemas.microsoft.com/office/drawing/2010/main">
+        <mc:Choice Requires="a14">
           <p:sp>
             <p:nvSpPr>
               <p:cNvPr id="5" name="TextBox 4">
@@ -9048,6 +10033,7 @@
               </a:bodyPr>
               <a:lstStyle/>
               <a:p>
+                <a:pPr/>
                 <a14:m>
                   <m:oMathPara xmlns:m="http://schemas.openxmlformats.org/officeDocument/2006/math">
                     <m:oMathParaPr>
@@ -9133,13 +10119,7 @@
                                 <a:rPr lang="en-US" sz="3000" b="0" i="1" smtClean="0">
                                   <a:latin typeface="Cambria Math" panose="02040503050406030204" pitchFamily="18" charset="0"/>
                                 </a:rPr>
-                                <m:t>3</m:t>
-                              </m:r>
-                              <m:r>
-                                <a:rPr lang="en-US" sz="3000" b="0" i="1" smtClean="0">
-                                  <a:latin typeface="Cambria Math" panose="02040503050406030204" pitchFamily="18" charset="0"/>
-                                </a:rPr>
-                                <m:t>−2</m:t>
+                                <m:t>3−2</m:t>
                               </m:r>
                             </m:e>
                           </m:d>
@@ -9159,7 +10139,7 @@
             </p:txBody>
           </p:sp>
         </mc:Choice>
-        <mc:Fallback>
+        <mc:Fallback xmlns="">
           <p:sp>
             <p:nvSpPr>
               <p:cNvPr id="5" name="TextBox 4">
@@ -9254,8 +10234,8 @@
           </a:p>
         </p:txBody>
       </p:sp>
-      <mc:AlternateContent xmlns:mc="http://schemas.openxmlformats.org/markup-compatibility/2006">
-        <mc:Choice xmlns:a14="http://schemas.microsoft.com/office/drawing/2010/main" Requires="a14">
+      <mc:AlternateContent xmlns:mc="http://schemas.openxmlformats.org/markup-compatibility/2006" xmlns:a14="http://schemas.microsoft.com/office/drawing/2010/main">
+        <mc:Choice Requires="a14">
           <p:sp>
             <p:nvSpPr>
               <p:cNvPr id="7" name="TextBox 6">
@@ -9284,6 +10264,7 @@
               </a:bodyPr>
               <a:lstStyle/>
               <a:p>
+                <a:pPr/>
                 <a14:m>
                   <m:oMathPara xmlns:m="http://schemas.openxmlformats.org/officeDocument/2006/math">
                     <m:oMathParaPr>
@@ -9372,7 +10353,7 @@
             </p:txBody>
           </p:sp>
         </mc:Choice>
-        <mc:Fallback>
+        <mc:Fallback xmlns="">
           <p:sp>
             <p:nvSpPr>
               <p:cNvPr id="7" name="TextBox 6">
@@ -9570,7 +10551,7 @@
 </p:sld>
 </file>
 
-<file path=ppt/slides/slide5.xml><?xml version="1.0" encoding="utf-8"?>
+<file path=ppt/slides/slide7.xml><?xml version="1.0" encoding="utf-8"?>
 <p:sld xmlns:a="http://schemas.openxmlformats.org/drawingml/2006/main" xmlns:r="http://schemas.openxmlformats.org/officeDocument/2006/relationships" xmlns:p="http://schemas.openxmlformats.org/presentationml/2006/main">
   <p:cSld>
     <p:spTree>
@@ -9615,8 +10596,8 @@
           </a:p>
         </p:txBody>
       </p:sp>
-      <mc:AlternateContent xmlns:mc="http://schemas.openxmlformats.org/markup-compatibility/2006">
-        <mc:Choice xmlns:a14="http://schemas.microsoft.com/office/drawing/2010/main" Requires="a14">
+      <mc:AlternateContent xmlns:mc="http://schemas.openxmlformats.org/markup-compatibility/2006" xmlns:a14="http://schemas.microsoft.com/office/drawing/2010/main">
+        <mc:Choice Requires="a14">
           <p:sp>
             <p:nvSpPr>
               <p:cNvPr id="6" name="TextBox 5">
@@ -9645,6 +10626,7 @@
               </a:bodyPr>
               <a:lstStyle/>
               <a:p>
+                <a:pPr/>
                 <a14:m>
                   <m:oMathPara xmlns:m="http://schemas.openxmlformats.org/officeDocument/2006/math">
                     <m:oMathParaPr>
@@ -9707,7 +10689,7 @@
             </p:txBody>
           </p:sp>
         </mc:Choice>
-        <mc:Fallback>
+        <mc:Fallback xmlns="">
           <p:sp>
             <p:nvSpPr>
               <p:cNvPr id="6" name="TextBox 5">
@@ -10078,7 +11060,7 @@
 </p:sld>
 </file>
 
-<file path=ppt/slides/slide6.xml><?xml version="1.0" encoding="utf-8"?>
+<file path=ppt/slides/slide8.xml><?xml version="1.0" encoding="utf-8"?>
 <p:sld xmlns:a="http://schemas.openxmlformats.org/drawingml/2006/main" xmlns:r="http://schemas.openxmlformats.org/officeDocument/2006/relationships" xmlns:p="http://schemas.openxmlformats.org/presentationml/2006/main">
   <p:cSld>
     <p:spTree>
@@ -10128,8 +11110,8 @@
           </a:p>
         </p:txBody>
       </p:sp>
-      <mc:AlternateContent xmlns:mc="http://schemas.openxmlformats.org/markup-compatibility/2006">
-        <mc:Choice xmlns:a14="http://schemas.microsoft.com/office/drawing/2010/main" Requires="a14">
+      <mc:AlternateContent xmlns:mc="http://schemas.openxmlformats.org/markup-compatibility/2006" xmlns:a14="http://schemas.microsoft.com/office/drawing/2010/main">
+        <mc:Choice Requires="a14">
           <p:sp>
             <p:nvSpPr>
               <p:cNvPr id="4" name="TextBox 3">
@@ -10158,6 +11140,7 @@
               </a:bodyPr>
               <a:lstStyle/>
               <a:p>
+                <a:pPr/>
                 <a14:m>
                   <m:oMathPara xmlns:m="http://schemas.openxmlformats.org/officeDocument/2006/math">
                     <m:oMathParaPr>
@@ -10221,7 +11204,7 @@
             </p:txBody>
           </p:sp>
         </mc:Choice>
-        <mc:Fallback>
+        <mc:Fallback xmlns="">
           <p:sp>
             <p:nvSpPr>
               <p:cNvPr id="4" name="TextBox 3">
@@ -10482,7 +11465,7 @@
 </p:sld>
 </file>
 
-<file path=ppt/slides/slide7.xml><?xml version="1.0" encoding="utf-8"?>
+<file path=ppt/slides/slide9.xml><?xml version="1.0" encoding="utf-8"?>
 <p:sld xmlns:a="http://schemas.openxmlformats.org/drawingml/2006/main" xmlns:r="http://schemas.openxmlformats.org/officeDocument/2006/relationships" xmlns:p="http://schemas.openxmlformats.org/presentationml/2006/main">
   <p:cSld>
     <p:spTree>
@@ -10563,8 +11546,8 @@
           </a:p>
         </p:txBody>
       </p:sp>
-      <mc:AlternateContent xmlns:mc="http://schemas.openxmlformats.org/markup-compatibility/2006">
-        <mc:Choice xmlns:a14="http://schemas.microsoft.com/office/drawing/2010/main" Requires="a14">
+      <mc:AlternateContent xmlns:mc="http://schemas.openxmlformats.org/markup-compatibility/2006" xmlns:a14="http://schemas.microsoft.com/office/drawing/2010/main">
+        <mc:Choice Requires="a14">
           <p:sp>
             <p:nvSpPr>
               <p:cNvPr id="7" name="TextBox 6">
@@ -10593,6 +11576,7 @@
               </a:bodyPr>
               <a:lstStyle/>
               <a:p>
+                <a:pPr/>
                 <a14:m>
                   <m:oMathPara xmlns:m="http://schemas.openxmlformats.org/officeDocument/2006/math">
                     <m:oMathParaPr>
@@ -10649,7 +11633,7 @@
             </p:txBody>
           </p:sp>
         </mc:Choice>
-        <mc:Fallback>
+        <mc:Fallback xmlns="">
           <p:sp>
             <p:nvSpPr>
               <p:cNvPr id="7" name="TextBox 6">
@@ -10694,8 +11678,8 @@
           </p:sp>
         </mc:Fallback>
       </mc:AlternateContent>
-      <mc:AlternateContent xmlns:mc="http://schemas.openxmlformats.org/markup-compatibility/2006">
-        <mc:Choice xmlns:a14="http://schemas.microsoft.com/office/drawing/2010/main" Requires="a14">
+      <mc:AlternateContent xmlns:mc="http://schemas.openxmlformats.org/markup-compatibility/2006" xmlns:a14="http://schemas.microsoft.com/office/drawing/2010/main">
+        <mc:Choice Requires="a14">
           <p:sp>
             <p:nvSpPr>
               <p:cNvPr id="8" name="TextBox 7">
@@ -10724,6 +11708,7 @@
               </a:bodyPr>
               <a:lstStyle/>
               <a:p>
+                <a:pPr/>
                 <a14:m>
                   <m:oMathPara xmlns:m="http://schemas.openxmlformats.org/officeDocument/2006/math">
                     <m:oMathParaPr>
@@ -10804,7 +11789,7 @@
             </p:txBody>
           </p:sp>
         </mc:Choice>
-        <mc:Fallback>
+        <mc:Fallback xmlns="">
           <p:sp>
             <p:nvSpPr>
               <p:cNvPr id="8" name="TextBox 7">
@@ -10849,8 +11834,8 @@
           </p:sp>
         </mc:Fallback>
       </mc:AlternateContent>
-      <mc:AlternateContent xmlns:mc="http://schemas.openxmlformats.org/markup-compatibility/2006">
-        <mc:Choice xmlns:a14="http://schemas.microsoft.com/office/drawing/2010/main" Requires="a14">
+      <mc:AlternateContent xmlns:mc="http://schemas.openxmlformats.org/markup-compatibility/2006" xmlns:a14="http://schemas.microsoft.com/office/drawing/2010/main">
+        <mc:Choice Requires="a14">
           <p:sp>
             <p:nvSpPr>
               <p:cNvPr id="9" name="TextBox 8">
@@ -10879,6 +11864,7 @@
               </a:bodyPr>
               <a:lstStyle/>
               <a:p>
+                <a:pPr/>
                 <a14:m>
                   <m:oMathPara xmlns:m="http://schemas.openxmlformats.org/officeDocument/2006/math">
                     <m:oMathParaPr>
@@ -10941,7 +11927,7 @@
             </p:txBody>
           </p:sp>
         </mc:Choice>
-        <mc:Fallback>
+        <mc:Fallback xmlns="">
           <p:sp>
             <p:nvSpPr>
               <p:cNvPr id="9" name="TextBox 8">
@@ -10986,8 +11972,8 @@
           </p:sp>
         </mc:Fallback>
       </mc:AlternateContent>
-      <mc:AlternateContent xmlns:mc="http://schemas.openxmlformats.org/markup-compatibility/2006">
-        <mc:Choice xmlns:a14="http://schemas.microsoft.com/office/drawing/2010/main" Requires="a14">
+      <mc:AlternateContent xmlns:mc="http://schemas.openxmlformats.org/markup-compatibility/2006" xmlns:a14="http://schemas.microsoft.com/office/drawing/2010/main">
+        <mc:Choice Requires="a14">
           <p:sp>
             <p:nvSpPr>
               <p:cNvPr id="10" name="TextBox 9">
@@ -11016,6 +12002,7 @@
               </a:bodyPr>
               <a:lstStyle/>
               <a:p>
+                <a:pPr/>
                 <a14:m>
                   <m:oMathPara xmlns:m="http://schemas.openxmlformats.org/officeDocument/2006/math">
                     <m:oMathParaPr>
@@ -11078,7 +12065,7 @@
             </p:txBody>
           </p:sp>
         </mc:Choice>
-        <mc:Fallback>
+        <mc:Fallback xmlns="">
           <p:sp>
             <p:nvSpPr>
               <p:cNvPr id="10" name="TextBox 9">
@@ -11127,627 +12114,6 @@
     <p:extLst>
       <p:ext uri="{BB962C8B-B14F-4D97-AF65-F5344CB8AC3E}">
         <p14:creationId xmlns:p14="http://schemas.microsoft.com/office/powerpoint/2010/main" val="445010256"/>
-      </p:ext>
-    </p:extLst>
-  </p:cSld>
-  <p:clrMapOvr>
-    <a:masterClrMapping/>
-  </p:clrMapOvr>
-</p:sld>
-</file>
-
-<file path=ppt/slides/slide8.xml><?xml version="1.0" encoding="utf-8"?>
-<p:sld xmlns:a="http://schemas.openxmlformats.org/drawingml/2006/main" xmlns:r="http://schemas.openxmlformats.org/officeDocument/2006/relationships" xmlns:p="http://schemas.openxmlformats.org/presentationml/2006/main">
-  <p:cSld>
-    <p:spTree>
-      <p:nvGrpSpPr>
-        <p:cNvPr id="1" name=""/>
-        <p:cNvGrpSpPr/>
-        <p:nvPr/>
-      </p:nvGrpSpPr>
-      <p:grpSpPr>
-        <a:xfrm>
-          <a:off x="0" y="0"/>
-          <a:ext cx="0" cy="0"/>
-          <a:chOff x="0" y="0"/>
-          <a:chExt cx="0" cy="0"/>
-        </a:xfrm>
-      </p:grpSpPr>
-      <p:sp>
-        <p:nvSpPr>
-          <p:cNvPr id="2" name="Title 1">
-            <a:extLst>
-              <a:ext uri="{FF2B5EF4-FFF2-40B4-BE49-F238E27FC236}">
-                <a16:creationId xmlns:a16="http://schemas.microsoft.com/office/drawing/2014/main" id="{4B21A50A-7B89-5106-7078-723CED01C9EB}"/>
-              </a:ext>
-            </a:extLst>
-          </p:cNvPr>
-          <p:cNvSpPr>
-            <a:spLocks noGrp="1"/>
-          </p:cNvSpPr>
-          <p:nvPr>
-            <p:ph type="title"/>
-          </p:nvPr>
-        </p:nvSpPr>
-        <p:spPr/>
-        <p:txBody>
-          <a:bodyPr/>
-          <a:lstStyle/>
-          <a:p>
-            <a:r>
-              <a:rPr lang="en-US" dirty="0"/>
-              <a:t>AIC uses likelihood for model selection</a:t>
-            </a:r>
-          </a:p>
-        </p:txBody>
-      </p:sp>
-      <mc:AlternateContent xmlns:mc="http://schemas.openxmlformats.org/markup-compatibility/2006">
-        <mc:Choice xmlns:a14="http://schemas.microsoft.com/office/drawing/2010/main" Requires="a14">
-          <p:sp>
-            <p:nvSpPr>
-              <p:cNvPr id="4" name="TextBox 3">
-                <a:extLst>
-                  <a:ext uri="{FF2B5EF4-FFF2-40B4-BE49-F238E27FC236}">
-                    <a16:creationId xmlns:a16="http://schemas.microsoft.com/office/drawing/2014/main" id="{6C42931D-12C0-2C69-3395-59462A322A2B}"/>
-                  </a:ext>
-                </a:extLst>
-              </p:cNvPr>
-              <p:cNvSpPr txBox="1"/>
-              <p:nvPr/>
-            </p:nvSpPr>
-            <p:spPr>
-              <a:xfrm>
-                <a:off x="3369583" y="3217331"/>
-                <a:ext cx="5101140" cy="521105"/>
-              </a:xfrm>
-              <a:prstGeom prst="rect">
-                <a:avLst/>
-              </a:prstGeom>
-              <a:noFill/>
-            </p:spPr>
-            <p:txBody>
-              <a:bodyPr wrap="none" lIns="0" tIns="0" rIns="0" bIns="0" rtlCol="0">
-                <a:spAutoFit/>
-              </a:bodyPr>
-              <a:lstStyle/>
-              <a:p>
-                <a14:m>
-                  <m:oMathPara xmlns:m="http://schemas.openxmlformats.org/officeDocument/2006/math">
-                    <m:oMathParaPr>
-                      <m:jc m:val="centerGroup"/>
-                    </m:oMathParaPr>
-                    <m:oMath xmlns:m="http://schemas.openxmlformats.org/officeDocument/2006/math">
-                      <m:r>
-                        <a:rPr lang="en-US" sz="3000" b="0" i="1" smtClean="0">
-                          <a:latin typeface="Cambria Math" panose="02040503050406030204" pitchFamily="18" charset="0"/>
-                        </a:rPr>
-                        <m:t>𝐴𝐼𝐶</m:t>
-                      </m:r>
-                      <m:r>
-                        <a:rPr lang="en-US" sz="3000" i="1" smtClean="0">
-                          <a:latin typeface="Cambria Math" panose="02040503050406030204" pitchFamily="18" charset="0"/>
-                        </a:rPr>
-                        <m:t>=</m:t>
-                      </m:r>
-                      <m:r>
-                        <a:rPr lang="en-US" sz="3000" b="0" i="1" smtClean="0">
-                          <a:latin typeface="Cambria Math" panose="02040503050406030204" pitchFamily="18" charset="0"/>
-                        </a:rPr>
-                        <m:t>−</m:t>
-                      </m:r>
-                      <m:r>
-                        <a:rPr lang="en-US" sz="3000" b="0" i="1" smtClean="0">
-                          <a:latin typeface="Cambria Math" panose="02040503050406030204" pitchFamily="18" charset="0"/>
-                        </a:rPr>
-                        <m:t>2</m:t>
-                      </m:r>
-                      <m:func>
-                        <m:funcPr>
-                          <m:ctrlPr>
-                            <a:rPr lang="en-US" sz="3000" b="0" i="1" smtClean="0">
-                              <a:latin typeface="Cambria Math" panose="02040503050406030204" pitchFamily="18" charset="0"/>
-                            </a:rPr>
-                          </m:ctrlPr>
-                        </m:funcPr>
-                        <m:fName>
-                          <m:r>
-                            <m:rPr>
-                              <m:sty m:val="p"/>
-                            </m:rPr>
-                            <a:rPr lang="en-US" sz="3000" b="0" i="0" smtClean="0">
-                              <a:latin typeface="Cambria Math" panose="02040503050406030204" pitchFamily="18" charset="0"/>
-                            </a:rPr>
-                            <m:t>ln</m:t>
-                          </m:r>
-                        </m:fName>
-                        <m:e>
-                          <m:d>
-                            <m:dPr>
-                              <m:ctrlPr>
-                                <a:rPr lang="en-US" sz="3000" b="0" i="1" smtClean="0">
-                                  <a:latin typeface="Cambria Math" panose="02040503050406030204" pitchFamily="18" charset="0"/>
-                                </a:rPr>
-                              </m:ctrlPr>
-                            </m:dPr>
-                            <m:e>
-                              <m:r>
-                                <a:rPr lang="en-US" sz="3000" b="0" i="1" smtClean="0">
-                                  <a:latin typeface="Cambria Math" panose="02040503050406030204" pitchFamily="18" charset="0"/>
-                                </a:rPr>
-                                <m:t>𝐿</m:t>
-                              </m:r>
-                              <m:r>
-                                <a:rPr lang="en-US" sz="3000" b="0" i="1" smtClean="0">
-                                  <a:latin typeface="Cambria Math" panose="02040503050406030204" pitchFamily="18" charset="0"/>
-                                </a:rPr>
-                                <m:t>(</m:t>
-                              </m:r>
-                              <m:acc>
-                                <m:accPr>
-                                  <m:chr m:val="̂"/>
-                                  <m:ctrlPr>
-                                    <a:rPr lang="en-US" sz="3000" b="0" i="1" smtClean="0">
-                                      <a:latin typeface="Cambria Math" panose="02040503050406030204" pitchFamily="18" charset="0"/>
-                                    </a:rPr>
-                                  </m:ctrlPr>
-                                </m:accPr>
-                                <m:e>
-                                  <m:r>
-                                    <a:rPr lang="en-US" sz="3000" b="0" i="1" smtClean="0">
-                                      <a:latin typeface="Cambria Math" panose="02040503050406030204" pitchFamily="18" charset="0"/>
-                                      <a:ea typeface="Cambria Math" panose="02040503050406030204" pitchFamily="18" charset="0"/>
-                                    </a:rPr>
-                                    <m:t>𝜃</m:t>
-                                  </m:r>
-                                </m:e>
-                              </m:acc>
-                              <m:r>
-                                <a:rPr lang="en-US" sz="3000" b="0" i="1" smtClean="0">
-                                  <a:latin typeface="Cambria Math" panose="02040503050406030204" pitchFamily="18" charset="0"/>
-                                </a:rPr>
-                                <m:t>|</m:t>
-                              </m:r>
-                              <m:r>
-                                <a:rPr lang="en-US" sz="3000" b="0" i="1" smtClean="0">
-                                  <a:latin typeface="Cambria Math" panose="02040503050406030204" pitchFamily="18" charset="0"/>
-                                </a:rPr>
-                                <m:t>𝑑𝑎𝑡𝑎</m:t>
-                              </m:r>
-                              <m:r>
-                                <a:rPr lang="en-US" sz="3000" b="0" i="1" smtClean="0">
-                                  <a:latin typeface="Cambria Math" panose="02040503050406030204" pitchFamily="18" charset="0"/>
-                                </a:rPr>
-                                <m:t>)</m:t>
-                              </m:r>
-                            </m:e>
-                          </m:d>
-                        </m:e>
-                      </m:func>
-                      <m:r>
-                        <a:rPr lang="en-US" sz="3000" b="0" i="1" smtClean="0">
-                          <a:latin typeface="Cambria Math" panose="02040503050406030204" pitchFamily="18" charset="0"/>
-                        </a:rPr>
-                        <m:t>+</m:t>
-                      </m:r>
-                      <m:r>
-                        <a:rPr lang="en-US" sz="3000" b="0" i="1" smtClean="0">
-                          <a:latin typeface="Cambria Math" panose="02040503050406030204" pitchFamily="18" charset="0"/>
-                        </a:rPr>
-                        <m:t>2</m:t>
-                      </m:r>
-                      <m:r>
-                        <a:rPr lang="en-US" sz="3000" b="0" i="1" smtClean="0">
-                          <a:latin typeface="Cambria Math" panose="02040503050406030204" pitchFamily="18" charset="0"/>
-                        </a:rPr>
-                        <m:t>𝐾</m:t>
-                      </m:r>
-                    </m:oMath>
-                  </m:oMathPara>
-                </a14:m>
-                <a:endParaRPr lang="en-US" sz="3000" dirty="0"/>
-              </a:p>
-            </p:txBody>
-          </p:sp>
-        </mc:Choice>
-        <mc:Fallback>
-          <p:sp>
-            <p:nvSpPr>
-              <p:cNvPr id="4" name="TextBox 3">
-                <a:extLst>
-                  <a:ext uri="{FF2B5EF4-FFF2-40B4-BE49-F238E27FC236}">
-                    <a16:creationId xmlns:a16="http://schemas.microsoft.com/office/drawing/2014/main" id="{6C42931D-12C0-2C69-3395-59462A322A2B}"/>
-                  </a:ext>
-                </a:extLst>
-              </p:cNvPr>
-              <p:cNvSpPr txBox="1">
-                <a:spLocks noRot="1" noChangeAspect="1" noMove="1" noResize="1" noEditPoints="1" noAdjustHandles="1" noChangeArrowheads="1" noChangeShapeType="1" noTextEdit="1"/>
-              </p:cNvSpPr>
-              <p:nvPr/>
-            </p:nvSpPr>
-            <p:spPr>
-              <a:xfrm>
-                <a:off x="3369583" y="3217331"/>
-                <a:ext cx="5101140" cy="521105"/>
-              </a:xfrm>
-              <a:prstGeom prst="rect">
-                <a:avLst/>
-              </a:prstGeom>
-              <a:blipFill>
-                <a:blip r:embed="rId2"/>
-                <a:stretch>
-                  <a:fillRect/>
-                </a:stretch>
-              </a:blipFill>
-            </p:spPr>
-            <p:txBody>
-              <a:bodyPr/>
-              <a:lstStyle/>
-              <a:p>
-                <a:r>
-                  <a:rPr lang="en-US">
-                    <a:noFill/>
-                  </a:rPr>
-                  <a:t> </a:t>
-                </a:r>
-              </a:p>
-            </p:txBody>
-          </p:sp>
-        </mc:Fallback>
-      </mc:AlternateContent>
-      <p:sp>
-        <p:nvSpPr>
-          <p:cNvPr id="5" name="TextBox 4">
-            <a:extLst>
-              <a:ext uri="{FF2B5EF4-FFF2-40B4-BE49-F238E27FC236}">
-                <a16:creationId xmlns:a16="http://schemas.microsoft.com/office/drawing/2014/main" id="{FDB04EBF-D24A-D162-0C37-53F9AC59DB2B}"/>
-              </a:ext>
-            </a:extLst>
-          </p:cNvPr>
-          <p:cNvSpPr txBox="1"/>
-          <p:nvPr/>
-        </p:nvSpPr>
-        <p:spPr>
-          <a:xfrm>
-            <a:off x="6775937" y="2571000"/>
-            <a:ext cx="2883877" cy="646331"/>
-          </a:xfrm>
-          <a:prstGeom prst="rect">
-            <a:avLst/>
-          </a:prstGeom>
-          <a:noFill/>
-        </p:spPr>
-        <p:txBody>
-          <a:bodyPr wrap="square" rtlCol="0">
-            <a:spAutoFit/>
-          </a:bodyPr>
-          <a:lstStyle/>
-          <a:p>
-            <a:pPr algn="ctr"/>
-            <a:r>
-              <a:rPr lang="en-US" dirty="0"/>
-              <a:t>Penalty for # of parameters (parsimony)</a:t>
-            </a:r>
-          </a:p>
-        </p:txBody>
-      </p:sp>
-      <p:sp>
-        <p:nvSpPr>
-          <p:cNvPr id="6" name="TextBox 5">
-            <a:extLst>
-              <a:ext uri="{FF2B5EF4-FFF2-40B4-BE49-F238E27FC236}">
-                <a16:creationId xmlns:a16="http://schemas.microsoft.com/office/drawing/2014/main" id="{793EB5DA-A33F-FD81-53EB-22A1FB435693}"/>
-              </a:ext>
-            </a:extLst>
-          </p:cNvPr>
-          <p:cNvSpPr txBox="1"/>
-          <p:nvPr/>
-        </p:nvSpPr>
-        <p:spPr>
-          <a:xfrm>
-            <a:off x="4478214" y="3798277"/>
-            <a:ext cx="2883877" cy="369332"/>
-          </a:xfrm>
-          <a:prstGeom prst="rect">
-            <a:avLst/>
-          </a:prstGeom>
-          <a:noFill/>
-        </p:spPr>
-        <p:txBody>
-          <a:bodyPr wrap="square" rtlCol="0">
-            <a:spAutoFit/>
-          </a:bodyPr>
-          <a:lstStyle/>
-          <a:p>
-            <a:pPr algn="ctr"/>
-            <a:r>
-              <a:rPr lang="en-US" dirty="0"/>
-              <a:t>Likelihood of the model</a:t>
-            </a:r>
-          </a:p>
-        </p:txBody>
-      </p:sp>
-      <p:sp>
-        <p:nvSpPr>
-          <p:cNvPr id="7" name="TextBox 6">
-            <a:extLst>
-              <a:ext uri="{FF2B5EF4-FFF2-40B4-BE49-F238E27FC236}">
-                <a16:creationId xmlns:a16="http://schemas.microsoft.com/office/drawing/2014/main" id="{7EA996F0-6002-1669-2BC8-C026EDBD2122}"/>
-              </a:ext>
-            </a:extLst>
-          </p:cNvPr>
-          <p:cNvSpPr txBox="1"/>
-          <p:nvPr/>
-        </p:nvSpPr>
-        <p:spPr>
-          <a:xfrm>
-            <a:off x="3119778" y="4945208"/>
-            <a:ext cx="5600747" cy="861774"/>
-          </a:xfrm>
-          <a:prstGeom prst="rect">
-            <a:avLst/>
-          </a:prstGeom>
-          <a:noFill/>
-        </p:spPr>
-        <p:txBody>
-          <a:bodyPr wrap="square" rtlCol="0">
-            <a:spAutoFit/>
-          </a:bodyPr>
-          <a:lstStyle/>
-          <a:p>
-            <a:pPr algn="ctr"/>
-            <a:r>
-              <a:rPr lang="en-US" sz="2500" i="1" dirty="0"/>
-              <a:t>The best model is the one with the smallest AIC</a:t>
-            </a:r>
-          </a:p>
-        </p:txBody>
-      </p:sp>
-    </p:spTree>
-    <p:extLst>
-      <p:ext uri="{BB962C8B-B14F-4D97-AF65-F5344CB8AC3E}">
-        <p14:creationId xmlns:p14="http://schemas.microsoft.com/office/powerpoint/2010/main" val="2042862758"/>
-      </p:ext>
-    </p:extLst>
-  </p:cSld>
-  <p:clrMapOvr>
-    <a:masterClrMapping/>
-  </p:clrMapOvr>
-  <p:timing>
-    <p:tnLst>
-      <p:par>
-        <p:cTn id="1" dur="indefinite" restart="never" nodeType="tmRoot">
-          <p:childTnLst>
-            <p:seq concurrent="1" nextAc="seek">
-              <p:cTn id="2" dur="indefinite" nodeType="mainSeq">
-                <p:childTnLst>
-                  <p:par>
-                    <p:cTn id="3" fill="hold">
-                      <p:stCondLst>
-                        <p:cond delay="indefinite"/>
-                      </p:stCondLst>
-                      <p:childTnLst>
-                        <p:par>
-                          <p:cTn id="4" fill="hold">
-                            <p:stCondLst>
-                              <p:cond delay="0"/>
-                            </p:stCondLst>
-                            <p:childTnLst>
-                              <p:par>
-                                <p:cTn id="5" presetID="10" presetClass="entr" presetSubtype="0" fill="hold" grpId="0" nodeType="clickEffect">
-                                  <p:stCondLst>
-                                    <p:cond delay="0"/>
-                                  </p:stCondLst>
-                                  <p:childTnLst>
-                                    <p:set>
-                                      <p:cBhvr>
-                                        <p:cTn id="6" dur="1" fill="hold">
-                                          <p:stCondLst>
-                                            <p:cond delay="0"/>
-                                          </p:stCondLst>
-                                        </p:cTn>
-                                        <p:tgtEl>
-                                          <p:spTgt spid="6"/>
-                                        </p:tgtEl>
-                                        <p:attrNameLst>
-                                          <p:attrName>style.visibility</p:attrName>
-                                        </p:attrNameLst>
-                                      </p:cBhvr>
-                                      <p:to>
-                                        <p:strVal val="visible"/>
-                                      </p:to>
-                                    </p:set>
-                                    <p:animEffect transition="in" filter="fade">
-                                      <p:cBhvr>
-                                        <p:cTn id="7" dur="500"/>
-                                        <p:tgtEl>
-                                          <p:spTgt spid="6"/>
-                                        </p:tgtEl>
-                                      </p:cBhvr>
-                                    </p:animEffect>
-                                  </p:childTnLst>
-                                </p:cTn>
-                              </p:par>
-                              <p:par>
-                                <p:cTn id="8" presetID="10" presetClass="entr" presetSubtype="0" fill="hold" grpId="0" nodeType="withEffect">
-                                  <p:stCondLst>
-                                    <p:cond delay="0"/>
-                                  </p:stCondLst>
-                                  <p:childTnLst>
-                                    <p:set>
-                                      <p:cBhvr>
-                                        <p:cTn id="9" dur="1" fill="hold">
-                                          <p:stCondLst>
-                                            <p:cond delay="0"/>
-                                          </p:stCondLst>
-                                        </p:cTn>
-                                        <p:tgtEl>
-                                          <p:spTgt spid="5"/>
-                                        </p:tgtEl>
-                                        <p:attrNameLst>
-                                          <p:attrName>style.visibility</p:attrName>
-                                        </p:attrNameLst>
-                                      </p:cBhvr>
-                                      <p:to>
-                                        <p:strVal val="visible"/>
-                                      </p:to>
-                                    </p:set>
-                                    <p:animEffect transition="in" filter="fade">
-                                      <p:cBhvr>
-                                        <p:cTn id="10" dur="500"/>
-                                        <p:tgtEl>
-                                          <p:spTgt spid="5"/>
-                                        </p:tgtEl>
-                                      </p:cBhvr>
-                                    </p:animEffect>
-                                  </p:childTnLst>
-                                </p:cTn>
-                              </p:par>
-                            </p:childTnLst>
-                          </p:cTn>
-                        </p:par>
-                      </p:childTnLst>
-                    </p:cTn>
-                  </p:par>
-                  <p:par>
-                    <p:cTn id="11" fill="hold">
-                      <p:stCondLst>
-                        <p:cond delay="indefinite"/>
-                      </p:stCondLst>
-                      <p:childTnLst>
-                        <p:par>
-                          <p:cTn id="12" fill="hold">
-                            <p:stCondLst>
-                              <p:cond delay="0"/>
-                            </p:stCondLst>
-                            <p:childTnLst>
-                              <p:par>
-                                <p:cTn id="13" presetID="10" presetClass="entr" presetSubtype="0" fill="hold" grpId="0" nodeType="clickEffect">
-                                  <p:stCondLst>
-                                    <p:cond delay="0"/>
-                                  </p:stCondLst>
-                                  <p:childTnLst>
-                                    <p:set>
-                                      <p:cBhvr>
-                                        <p:cTn id="14" dur="1" fill="hold">
-                                          <p:stCondLst>
-                                            <p:cond delay="0"/>
-                                          </p:stCondLst>
-                                        </p:cTn>
-                                        <p:tgtEl>
-                                          <p:spTgt spid="7"/>
-                                        </p:tgtEl>
-                                        <p:attrNameLst>
-                                          <p:attrName>style.visibility</p:attrName>
-                                        </p:attrNameLst>
-                                      </p:cBhvr>
-                                      <p:to>
-                                        <p:strVal val="visible"/>
-                                      </p:to>
-                                    </p:set>
-                                    <p:animEffect transition="in" filter="fade">
-                                      <p:cBhvr>
-                                        <p:cTn id="15" dur="500"/>
-                                        <p:tgtEl>
-                                          <p:spTgt spid="7"/>
-                                        </p:tgtEl>
-                                      </p:cBhvr>
-                                    </p:animEffect>
-                                  </p:childTnLst>
-                                </p:cTn>
-                              </p:par>
-                            </p:childTnLst>
-                          </p:cTn>
-                        </p:par>
-                      </p:childTnLst>
-                    </p:cTn>
-                  </p:par>
-                </p:childTnLst>
-              </p:cTn>
-              <p:prevCondLst>
-                <p:cond evt="onPrev" delay="0">
-                  <p:tgtEl>
-                    <p:sldTgt/>
-                  </p:tgtEl>
-                </p:cond>
-              </p:prevCondLst>
-              <p:nextCondLst>
-                <p:cond evt="onNext" delay="0">
-                  <p:tgtEl>
-                    <p:sldTgt/>
-                  </p:tgtEl>
-                </p:cond>
-              </p:nextCondLst>
-            </p:seq>
-          </p:childTnLst>
-        </p:cTn>
-      </p:par>
-    </p:tnLst>
-    <p:bldLst>
-      <p:bldP spid="5" grpId="0"/>
-      <p:bldP spid="6" grpId="0"/>
-      <p:bldP spid="7" grpId="0"/>
-    </p:bldLst>
-  </p:timing>
-</p:sld>
-</file>
-
-<file path=ppt/slides/slide9.xml><?xml version="1.0" encoding="utf-8"?>
-<p:sld xmlns:a="http://schemas.openxmlformats.org/drawingml/2006/main" xmlns:r="http://schemas.openxmlformats.org/officeDocument/2006/relationships" xmlns:p="http://schemas.openxmlformats.org/presentationml/2006/main">
-  <p:cSld>
-    <p:spTree>
-      <p:nvGrpSpPr>
-        <p:cNvPr id="1" name=""/>
-        <p:cNvGrpSpPr/>
-        <p:nvPr/>
-      </p:nvGrpSpPr>
-      <p:grpSpPr>
-        <a:xfrm>
-          <a:off x="0" y="0"/>
-          <a:ext cx="0" cy="0"/>
-          <a:chOff x="0" y="0"/>
-          <a:chExt cx="0" cy="0"/>
-        </a:xfrm>
-      </p:grpSpPr>
-      <p:pic>
-        <p:nvPicPr>
-          <p:cNvPr id="3" name="Picture 2" descr="A close-up of a document&#10;&#10;Description automatically generated">
-            <a:extLst>
-              <a:ext uri="{FF2B5EF4-FFF2-40B4-BE49-F238E27FC236}">
-                <a16:creationId xmlns:a16="http://schemas.microsoft.com/office/drawing/2014/main" id="{68B24415-0E6A-2CB7-AD41-D4CFE7DC024E}"/>
-              </a:ext>
-            </a:extLst>
-          </p:cNvPr>
-          <p:cNvPicPr>
-            <a:picLocks noChangeAspect="1"/>
-          </p:cNvPicPr>
-          <p:nvPr/>
-        </p:nvPicPr>
-        <p:blipFill>
-          <a:blip r:embed="rId2">
-            <a:extLst>
-              <a:ext uri="{28A0092B-C50C-407E-A947-70E740481C1C}">
-                <a14:useLocalDpi xmlns:a14="http://schemas.microsoft.com/office/drawing/2010/main" val="0"/>
-              </a:ext>
-            </a:extLst>
-          </a:blip>
-          <a:stretch>
-            <a:fillRect/>
-          </a:stretch>
-        </p:blipFill>
-        <p:spPr>
-          <a:xfrm>
-            <a:off x="0" y="759141"/>
-            <a:ext cx="12192000" cy="4988025"/>
-          </a:xfrm>
-          <a:prstGeom prst="rect">
-            <a:avLst/>
-          </a:prstGeom>
-        </p:spPr>
-      </p:pic>
-    </p:spTree>
-    <p:extLst>
-      <p:ext uri="{BB962C8B-B14F-4D97-AF65-F5344CB8AC3E}">
-        <p14:creationId xmlns:p14="http://schemas.microsoft.com/office/powerpoint/2010/main" val="2862968705"/>
       </p:ext>
     </p:extLst>
   </p:cSld>

</xml_diff>